<commit_message>
Fact sheet ChaLearn Multimodal Gesture Recognition.pptx
</commit_message>
<xml_diff>
--- a/Fact sheet ChaLearn Multimodal Gesture Recognition.pptx
+++ b/Fact sheet ChaLearn Multimodal Gesture Recognition.pptx
@@ -2271,8 +2271,8 @@
         </p:nvSpPr>
         <p:spPr>
           <a:xfrm>
-            <a:off x="457200" y="274680"/>
-            <a:ext cx="8228880" cy="1142640"/>
+            <a:off x="457200" y="273600"/>
+            <a:ext cx="8228880" cy="1144800"/>
           </a:xfrm>
           <a:prstGeom prst="rect">
             <a:avLst/>
@@ -2302,7 +2302,7 @@
         <p:spPr>
           <a:xfrm>
             <a:off x="457200" y="1604520"/>
-            <a:ext cx="8229240" cy="3977280"/>
+            <a:ext cx="8228880" cy="3976920"/>
           </a:xfrm>
           <a:prstGeom prst="rect">
             <a:avLst/>
@@ -2623,7 +2623,7 @@
         </p:nvGraphicFramePr>
         <p:xfrm>
           <a:off x="152280" y="152280"/>
-          <a:ext cx="8838360" cy="6552360"/>
+          <a:ext cx="8838000" cy="6552000"/>
         </p:xfrm>
         <a:graphic>
           <a:graphicData uri="http://schemas.openxmlformats.org/drawingml/2006/table">
@@ -2631,7 +2631,7 @@
               <a:tblPr/>
               <a:tblGrid>
                 <a:gridCol w="2590560"/>
-                <a:gridCol w="6247800"/>
+                <a:gridCol w="6247440"/>
               </a:tblGrid>
               <a:tr h="1116000">
                 <a:tc>
@@ -2834,7 +2834,7 @@
                   <a:tcPr/>
                 </a:tc>
               </a:tr>
-              <a:tr h="1116000">
+              <a:tr h="1115640">
                 <a:tc>
                   <a:txBody>
                     <a:bodyPr wrap="none"/>
@@ -2923,7 +2923,7 @@
         </p:nvGraphicFramePr>
         <p:xfrm>
           <a:off x="152280" y="152280"/>
-          <a:ext cx="8838360" cy="6552360"/>
+          <a:ext cx="8838000" cy="6552000"/>
         </p:xfrm>
         <a:graphic>
           <a:graphicData uri="http://schemas.openxmlformats.org/drawingml/2006/table">
@@ -2931,7 +2931,7 @@
               <a:tblPr/>
               <a:tblGrid>
                 <a:gridCol w="2609640"/>
-                <a:gridCol w="6228720"/>
+                <a:gridCol w="6228360"/>
               </a:tblGrid>
               <a:tr h="942120">
                 <a:tc>
@@ -3072,8 +3072,8 @@
                     <a:bodyPr wrap="none"/>
                     <a:p>
                       <a:r>
-                        <a:rPr lang="en-US"/>
-                        <a:t>We use two different approaches, the first finds gesture intervals (unsupervised) using the audio files and extracts features from this intervals (MFCC). The second approach uses summary statistics (median, var, min, max) on the first 40 frames for each gesture to construct training samples. The prediction phase uses a sliding window. We create a weighted average of the output of the two models.</a:t>
+                        <a:rPr lang="en-US" sz="1600"/>
+                        <a:t>We use two different approaches, the first finds gesture intervals (unsupervised) using the audio files and extracts features from this intervals (MFCC). Using these features, we train a random forest and gradient boosting classifier. The second approach uses summary statistics (median, var, min, max) on the first 40 frames for each gesture to construct training samples. The prediction phase uses a sliding window. We create a weighted average of the output of the two models.</a:t>
                       </a:r>
                       <a:endParaRPr/>
                     </a:p>
@@ -3081,7 +3081,7 @@
                   <a:tcPr/>
                 </a:tc>
               </a:tr>
-              <a:tr h="2154960">
+              <a:tr h="2154600">
                 <a:tc>
                   <a:txBody>
                     <a:bodyPr wrap="none"/>
@@ -3106,6 +3106,36 @@
                   <a:tcPr/>
                 </a:tc>
                 <a:tc>
+                  <a:txBody>
+                    <a:bodyPr wrap="none"/>
+                    <a:p>
+                      <a:r>
+                        <a:rPr lang="en-US" sz="1400"/>
+                        <a:t>Davis, S. Mermelstein, P. (1980) Comparison of Parametric Representations for Monosyllabic Word Recognition in Continuously Spoken Sentences. In IEEE Transactions on Acoustics, Speech, and Signal Processing, Vol. 28 No. 4, pp. 357-366</a:t>
+                      </a:r>
+                      <a:endParaRPr/>
+                    </a:p>
+                    <a:p>
+                      <a:endParaRPr/>
+                    </a:p>
+                    <a:p>
+                      <a:r>
+                        <a:rPr lang="en-US" sz="1400"/>
+                        <a:t>X. Huang, A. Acero, and H. Hon. Spoken Language Processing: A guide to theory, algorithm, and system development. Prentice Hall, 2001.</a:t>
+                      </a:r>
+                      <a:endParaRPr/>
+                    </a:p>
+                    <a:p>
+                      <a:endParaRPr/>
+                    </a:p>
+                    <a:p>
+                      <a:r>
+                        <a:rPr lang="en-US" sz="1400"/>
+                        <a:t>Scikit-learn: Machine Learning in Python, Pedregosa et al., JMLR 12, pp. 2825-2830, 2011.</a:t>
+                      </a:r>
+                      <a:endParaRPr/>
+                    </a:p>
+                  </a:txBody>
                   <a:tcPr/>
                 </a:tc>
               </a:tr>
@@ -3170,7 +3200,7 @@
         </p:nvGraphicFramePr>
         <p:xfrm>
           <a:off x="152280" y="152280"/>
-          <a:ext cx="8838360" cy="6552360"/>
+          <a:ext cx="8838000" cy="6552000"/>
         </p:xfrm>
         <a:graphic>
           <a:graphicData uri="http://schemas.openxmlformats.org/drawingml/2006/table">
@@ -3178,7 +3208,7 @@
               <a:tblPr/>
               <a:tblGrid>
                 <a:gridCol w="2609640"/>
-                <a:gridCol w="6228720"/>
+                <a:gridCol w="6228360"/>
               </a:tblGrid>
               <a:tr h="1261800">
                 <a:tc>
@@ -3233,6 +3263,23 @@
                   <a:tcPr/>
                 </a:tc>
                 <a:tc>
+                  <a:txBody>
+                    <a:bodyPr wrap="none"/>
+                    <a:p>
+                      <a:r>
+                        <a:rPr lang="en-US"/>
+                        <a:t>The first 13 Mel Frequency Cepstral Coefficients on sound data for each interval.</a:t>
+                      </a:r>
+                      <a:endParaRPr/>
+                    </a:p>
+                    <a:p>
+                      <a:r>
+                        <a:rPr lang="en-US" sz="1600"/>
+                        <a:t>(median, var, min, max) on the first 40 frames for each gesture</a:t>
+                      </a:r>
+                      <a:endParaRPr/>
+                    </a:p>
+                  </a:txBody>
                   <a:tcPr/>
                 </a:tc>
               </a:tr>
@@ -3312,7 +3359,7 @@
                   <a:tcPr/>
                 </a:tc>
               </a:tr>
-              <a:tr h="1537200">
+              <a:tr h="1536840">
                 <a:tc>
                   <a:txBody>
                     <a:bodyPr wrap="none"/>
@@ -3411,7 +3458,7 @@
         </p:nvGraphicFramePr>
         <p:xfrm>
           <a:off x="152280" y="152280"/>
-          <a:ext cx="8838360" cy="6552360"/>
+          <a:ext cx="8838000" cy="6552000"/>
         </p:xfrm>
         <a:graphic>
           <a:graphicData uri="http://schemas.openxmlformats.org/drawingml/2006/table">
@@ -3419,7 +3466,7 @@
               <a:tblPr/>
               <a:tblGrid>
                 <a:gridCol w="2609640"/>
-                <a:gridCol w="6228720"/>
+                <a:gridCol w="6228360"/>
               </a:tblGrid>
               <a:tr h="1159200">
                 <a:tc>
@@ -3474,6 +3521,18 @@
                   <a:tcPr/>
                 </a:tc>
                 <a:tc>
+                  <a:txBody>
+                    <a:bodyPr wrap="none"/>
+                    <a:p>
+                      <a:r>
+                        <a:rPr lang="en-US">
+                          <a:latin typeface="Arial"/>
+                        </a:rPr>
+                        <a:t>Based on an easy metric to find voices intervals. Our algorithm looks for high variation on the sound data. The length of the found interval must be greater than a certain threshold. From here, we can post-process our interval results by looking if a interval is useless because doesn't intersect with movements. Or for some cases, if we need to merge two sounds data together.</a:t>
+                      </a:r>
+                      <a:endParaRPr/>
+                    </a:p>
+                  </a:txBody>
                   <a:tcPr/>
                 </a:tc>
               </a:tr>
@@ -3543,7 +3602,7 @@
                   <a:tcPr/>
                 </a:tc>
               </a:tr>
-              <a:tr h="1843200">
+              <a:tr h="1842840">
                 <a:tc>
                   <a:txBody>
                     <a:bodyPr wrap="none"/>
@@ -3632,7 +3691,7 @@
         </p:nvGraphicFramePr>
         <p:xfrm>
           <a:off x="152280" y="152280"/>
-          <a:ext cx="8838360" cy="6552360"/>
+          <a:ext cx="8838000" cy="6552000"/>
         </p:xfrm>
         <a:graphic>
           <a:graphicData uri="http://schemas.openxmlformats.org/drawingml/2006/table">
@@ -3640,7 +3699,7 @@
               <a:tblPr/>
               <a:tblGrid>
                 <a:gridCol w="2609640"/>
-                <a:gridCol w="6228720"/>
+                <a:gridCol w="6228360"/>
               </a:tblGrid>
               <a:tr h="2184120">
                 <a:tc>
@@ -3708,7 +3767,7 @@
                   <a:tcPr/>
                 </a:tc>
               </a:tr>
-              <a:tr h="2184120">
+              <a:tr h="2183760">
                 <a:tc>
                   <a:txBody>
                     <a:bodyPr wrap="none"/>
@@ -3824,7 +3883,7 @@
         </p:nvGraphicFramePr>
         <p:xfrm>
           <a:off x="152280" y="152280"/>
-          <a:ext cx="8838360" cy="6552360"/>
+          <a:ext cx="8838000" cy="6552000"/>
         </p:xfrm>
         <a:graphic>
           <a:graphicData uri="http://schemas.openxmlformats.org/drawingml/2006/table">
@@ -3832,7 +3891,7 @@
               <a:tblPr/>
               <a:tblGrid>
                 <a:gridCol w="2609640"/>
-                <a:gridCol w="6228720"/>
+                <a:gridCol w="6228360"/>
               </a:tblGrid>
               <a:tr h="2184120">
                 <a:tc>
@@ -3900,7 +3959,7 @@
                   <a:tcPr/>
                 </a:tc>
               </a:tr>
-              <a:tr h="2184120">
+              <a:tr h="2183760">
                 <a:tc>
                   <a:txBody>
                     <a:bodyPr wrap="none"/>
@@ -3999,7 +4058,7 @@
         </p:nvGraphicFramePr>
         <p:xfrm>
           <a:off x="152280" y="152280"/>
-          <a:ext cx="8838360" cy="6552360"/>
+          <a:ext cx="8838000" cy="6552000"/>
         </p:xfrm>
         <a:graphic>
           <a:graphicData uri="http://schemas.openxmlformats.org/drawingml/2006/table">
@@ -4007,7 +4066,7 @@
               <a:tblPr/>
               <a:tblGrid>
                 <a:gridCol w="2609640"/>
-                <a:gridCol w="6228720"/>
+                <a:gridCol w="6228360"/>
               </a:tblGrid>
               <a:tr h="1748520">
                 <a:tc>
@@ -4115,7 +4174,7 @@
                     <a:p>
                       <a:r>
                         <a:rPr lang="en-US"/>
-                        <a:t>10H</a:t>
+                        <a:t>4h (model1) + 5h (model2) / 40mn (on the whole dataset)</a:t>
                       </a:r>
                       <a:endParaRPr/>
                     </a:p>
@@ -4123,7 +4182,7 @@
                   <a:tcPr/>
                 </a:tc>
               </a:tr>
-              <a:tr h="1950840">
+              <a:tr h="1950480">
                 <a:tc>
                   <a:txBody>
                     <a:bodyPr wrap="none"/>

</xml_diff>